<commit_message>
Capitulo I, parte Ashley
</commit_message>
<xml_diff>
--- a/Stranger Maze.pptx
+++ b/Stranger Maze.pptx
@@ -5813,12 +5813,16 @@
           <a:lstStyle/>
           <a:p>
             <a:r>
-              <a:rPr lang="es-DO" sz="2400" dirty="0" smtClean="0"/>
+              <a:rPr lang="es-DO" dirty="0" smtClean="0"/>
               <a:t>Yamilka</a:t>
             </a:r>
             <a:r>
+              <a:rPr lang="es-DO" sz="1600" dirty="0" smtClean="0"/>
+              <a:t> </a:t>
+            </a:r>
+            <a:r>
               <a:rPr lang="es-DO" dirty="0" smtClean="0"/>
-              <a:t> Gómez, Wayddy Grullón y Jean Ureña</a:t>
+              <a:t>Gómez, Wayddy Grullón y Jean Ureña</a:t>
             </a:r>
             <a:endParaRPr lang="es-DO" dirty="0"/>
           </a:p>

</xml_diff>